<commit_message>
More Dragon Animation, log update
</commit_message>
<xml_diff>
--- a/Documents/Weekly Production Logs/Fermata_ProductionLog_week4.pptx
+++ b/Documents/Weekly Production Logs/Fermata_ProductionLog_week4.pptx
@@ -4899,7 +4899,7 @@
             <p:ph idx="1"/>
             <p:extLst>
               <p:ext uri="{D42A27DB-BD31-4B8C-83A1-F6EECF244321}">
-                <p14:modId xmlns:p14="http://schemas.microsoft.com/office/powerpoint/2010/main" val="3380525771"/>
+                <p14:modId xmlns:p14="http://schemas.microsoft.com/office/powerpoint/2010/main" val="1466408464"/>
               </p:ext>
             </p:extLst>
           </p:nvPr>
@@ -4993,7 +4993,7 @@
                     <a:lstStyle/>
                     <a:p>
                       <a:r>
-                        <a:rPr lang="en-US" dirty="0"/>
+                        <a:rPr lang="en-US" b="1" dirty="0"/>
                         <a:t>Player Display UI, Stage Select UI, Powerup Icons</a:t>
                       </a:r>
                     </a:p>
@@ -5056,7 +5056,7 @@
                     <a:lstStyle/>
                     <a:p>
                       <a:r>
-                        <a:rPr lang="en-US" dirty="0"/>
+                        <a:rPr lang="en-US" b="1" dirty="0"/>
                         <a:t>Dragon animations</a:t>
                       </a:r>
                     </a:p>
@@ -5099,32 +5099,37 @@
                     <a:lstStyle/>
                     <a:p>
                       <a:r>
+                        <a:rPr lang="en-US" b="1" dirty="0"/>
+                        <a:t>Programming power ups</a:t>
+                      </a:r>
+                    </a:p>
+                  </a:txBody>
+                  <a:tcPr/>
+                </a:tc>
+                <a:tc>
+                  <a:txBody>
+                    <a:bodyPr/>
+                    <a:lstStyle/>
+                    <a:p>
+                      <a:endParaRPr lang="en-US" dirty="0"/>
+                    </a:p>
+                  </a:txBody>
+                  <a:tcPr/>
+                </a:tc>
+                <a:tc>
+                  <a:txBody>
+                    <a:bodyPr/>
+                    <a:lstStyle/>
+                    <a:p>
+                      <a:r>
                         <a:rPr lang="en-US" dirty="0"/>
-                        <a:t>Programming power ups</a:t>
-                      </a:r>
-                    </a:p>
-                  </a:txBody>
-                  <a:tcPr/>
-                </a:tc>
-                <a:tc>
-                  <a:txBody>
-                    <a:bodyPr/>
-                    <a:lstStyle/>
-                    <a:p>
+                        <a:t>Powerups that changed playstyle were nice, powerups that simply added slightly on regular attack were </a:t>
+                      </a:r>
+                      <a:r>
+                        <a:rPr lang="en-US"/>
+                        <a:t>less interesting</a:t>
+                      </a:r>
                       <a:endParaRPr lang="en-US" dirty="0"/>
-                    </a:p>
-                  </a:txBody>
-                  <a:tcPr/>
-                </a:tc>
-                <a:tc>
-                  <a:txBody>
-                    <a:bodyPr/>
-                    <a:lstStyle/>
-                    <a:p>
-                      <a:r>
-                        <a:rPr lang="en-US" dirty="0"/>
-                        <a:t>Powerups that changed playstyle were nice, powerups that simply added slightly on regular attack were boring</a:t>
-                      </a:r>
                     </a:p>
                   </a:txBody>
                   <a:tcPr/>

</xml_diff>

<commit_message>
Updated week 4 production log
</commit_message>
<xml_diff>
--- a/Documents/Weekly Production Logs/Fermata_ProductionLog_week4.pptx
+++ b/Documents/Weekly Production Logs/Fermata_ProductionLog_week4.pptx
@@ -212,7 +212,7 @@
           <a:p>
             <a:fld id="{24E03706-46C7-40D1-AB45-80A0B13C524D}" type="datetimeFigureOut">
               <a:rPr lang="en-US" smtClean="0"/>
-              <a:t>11/15/2018</a:t>
+              <a:t>11/16/2018</a:t>
             </a:fld>
             <a:endParaRPr lang="en-US"/>
           </a:p>
@@ -656,7 +656,7 @@
             <a:fld id="{5586B75A-687E-405C-8A0B-8D00578BA2C3}" type="datetimeFigureOut">
               <a:rPr lang="en-US" smtClean="0"/>
               <a:pPr/>
-              <a:t>11/15/2018</a:t>
+              <a:t>11/16/2018</a:t>
             </a:fld>
             <a:endParaRPr lang="en-US" dirty="0"/>
           </a:p>
@@ -828,7 +828,7 @@
             <a:fld id="{5586B75A-687E-405C-8A0B-8D00578BA2C3}" type="datetimeFigureOut">
               <a:rPr lang="en-US" smtClean="0"/>
               <a:pPr/>
-              <a:t>11/15/2018</a:t>
+              <a:t>11/16/2018</a:t>
             </a:fld>
             <a:endParaRPr lang="en-US" dirty="0"/>
           </a:p>
@@ -1053,7 +1053,7 @@
             <a:fld id="{5586B75A-687E-405C-8A0B-8D00578BA2C3}" type="datetimeFigureOut">
               <a:rPr lang="en-US" smtClean="0"/>
               <a:pPr/>
-              <a:t>11/15/2018</a:t>
+              <a:t>11/16/2018</a:t>
             </a:fld>
             <a:endParaRPr lang="en-US" dirty="0"/>
           </a:p>
@@ -1235,7 +1235,7 @@
             <a:fld id="{5586B75A-687E-405C-8A0B-8D00578BA2C3}" type="datetimeFigureOut">
               <a:rPr lang="en-US" smtClean="0"/>
               <a:pPr/>
-              <a:t>11/15/2018</a:t>
+              <a:t>11/16/2018</a:t>
             </a:fld>
             <a:endParaRPr lang="en-US" dirty="0"/>
           </a:p>
@@ -1543,7 +1543,7 @@
             <a:fld id="{5586B75A-687E-405C-8A0B-8D00578BA2C3}" type="datetimeFigureOut">
               <a:rPr lang="en-US" smtClean="0"/>
               <a:pPr/>
-              <a:t>11/15/2018</a:t>
+              <a:t>11/16/2018</a:t>
             </a:fld>
             <a:endParaRPr lang="en-US" dirty="0"/>
           </a:p>
@@ -1849,7 +1849,7 @@
             <a:fld id="{5586B75A-687E-405C-8A0B-8D00578BA2C3}" type="datetimeFigureOut">
               <a:rPr lang="en-US" smtClean="0"/>
               <a:pPr/>
-              <a:t>11/15/2018</a:t>
+              <a:t>11/16/2018</a:t>
             </a:fld>
             <a:endParaRPr lang="en-US" dirty="0"/>
           </a:p>
@@ -2273,7 +2273,7 @@
             <a:fld id="{5586B75A-687E-405C-8A0B-8D00578BA2C3}" type="datetimeFigureOut">
               <a:rPr lang="en-US" smtClean="0"/>
               <a:pPr/>
-              <a:t>11/15/2018</a:t>
+              <a:t>11/16/2018</a:t>
             </a:fld>
             <a:endParaRPr lang="en-US" dirty="0"/>
           </a:p>
@@ -2393,7 +2393,7 @@
             <a:fld id="{5586B75A-687E-405C-8A0B-8D00578BA2C3}" type="datetimeFigureOut">
               <a:rPr lang="en-US" smtClean="0"/>
               <a:pPr/>
-              <a:t>11/15/2018</a:t>
+              <a:t>11/16/2018</a:t>
             </a:fld>
             <a:endParaRPr lang="en-US" dirty="0"/>
           </a:p>
@@ -2490,7 +2490,7 @@
             <a:fld id="{5586B75A-687E-405C-8A0B-8D00578BA2C3}" type="datetimeFigureOut">
               <a:rPr lang="en-US" smtClean="0"/>
               <a:pPr/>
-              <a:t>11/15/2018</a:t>
+              <a:t>11/16/2018</a:t>
             </a:fld>
             <a:endParaRPr lang="en-US" dirty="0"/>
           </a:p>
@@ -2765,7 +2765,7 @@
             <a:fld id="{5586B75A-687E-405C-8A0B-8D00578BA2C3}" type="datetimeFigureOut">
               <a:rPr lang="en-US" smtClean="0"/>
               <a:pPr/>
-              <a:t>11/15/2018</a:t>
+              <a:t>11/16/2018</a:t>
             </a:fld>
             <a:endParaRPr lang="en-US" dirty="0"/>
           </a:p>
@@ -3032,7 +3032,7 @@
             <a:fld id="{5586B75A-687E-405C-8A0B-8D00578BA2C3}" type="datetimeFigureOut">
               <a:rPr lang="en-US" smtClean="0"/>
               <a:pPr/>
-              <a:t>11/15/2018</a:t>
+              <a:t>11/16/2018</a:t>
             </a:fld>
             <a:endParaRPr lang="en-US" dirty="0"/>
           </a:p>
@@ -3283,7 +3283,7 @@
             <a:fld id="{5586B75A-687E-405C-8A0B-8D00578BA2C3}" type="datetimeFigureOut">
               <a:rPr lang="en-US" smtClean="0"/>
               <a:pPr/>
-              <a:t>11/15/2018</a:t>
+              <a:t>11/16/2018</a:t>
             </a:fld>
             <a:endParaRPr lang="en-US" dirty="0"/>
           </a:p>
@@ -7294,14 +7294,14 @@
             <p:ph idx="1"/>
             <p:extLst>
               <p:ext uri="{D42A27DB-BD31-4B8C-83A1-F6EECF244321}">
-                <p14:modId xmlns:p14="http://schemas.microsoft.com/office/powerpoint/2010/main" val="2738587083"/>
+                <p14:modId xmlns:p14="http://schemas.microsoft.com/office/powerpoint/2010/main" val="4059854470"/>
               </p:ext>
             </p:extLst>
           </p:nvPr>
         </p:nvGraphicFramePr>
         <p:xfrm>
           <a:off x="1206409" y="2276552"/>
-          <a:ext cx="9780588" cy="2709435"/>
+          <a:ext cx="9780588" cy="3248511"/>
         </p:xfrm>
         <a:graphic>
           <a:graphicData uri="http://schemas.openxmlformats.org/drawingml/2006/table">
@@ -7409,7 +7409,10 @@
                     <a:bodyPr/>
                     <a:lstStyle/>
                     <a:p>
-                      <a:endParaRPr lang="en-US" dirty="0"/>
+                      <a:r>
+                        <a:rPr lang="en-US" dirty="0"/>
+                        <a:t>Dragon victory animation, skinning adjustments, dizzy star model</a:t>
+                      </a:r>
                     </a:p>
                   </a:txBody>
                   <a:tcPr/>
@@ -7458,6 +7461,10 @@
                     <a:bodyPr/>
                     <a:lstStyle/>
                     <a:p>
+                      <a:r>
+                        <a:rPr lang="en-AU" dirty="0"/>
+                        <a:t>Modelled pedestals, textured pedestals, redid black and white bunny textures, worked on title</a:t>
+                      </a:r>
                       <a:endParaRPr lang="en-US" dirty="0"/>
                     </a:p>
                   </a:txBody>
@@ -7525,7 +7532,10 @@
                     <a:bodyPr/>
                     <a:lstStyle/>
                     <a:p>
-                      <a:endParaRPr lang="en-US" dirty="0"/>
+                      <a:r>
+                        <a:rPr lang="en-US" dirty="0"/>
+                        <a:t>End Screen UI visuals, Images for Instructions/How To Play, UI Animation, Menu UI visuals </a:t>
+                      </a:r>
                     </a:p>
                   </a:txBody>
                   <a:tcPr/>
@@ -7556,56 +7566,7 @@
                         <a:buNone/>
                       </a:pPr>
                       <a:r>
-                        <a:rPr lang="en-US" sz="1800" b="0" i="0" u="none" strike="noStrike" noProof="0">
-                          <a:solidFill>
-                            <a:srgbClr val="000000"/>
-                          </a:solidFill>
-                          <a:latin typeface="Corbel"/>
-                        </a:rPr>
-                        <a:t>Richard (Doug) Tilden</a:t>
-                      </a:r>
-                      <a:endParaRPr lang="en-US"/>
-                    </a:p>
-                  </a:txBody>
-                  <a:tcPr/>
-                </a:tc>
-                <a:tc>
-                  <a:txBody>
-                    <a:bodyPr/>
-                    <a:lstStyle/>
-                    <a:p>
-                      <a:endParaRPr lang="en-US" dirty="0"/>
-                    </a:p>
-                  </a:txBody>
-                  <a:tcPr/>
-                </a:tc>
-                <a:tc>
-                  <a:txBody>
-                    <a:bodyPr/>
-                    <a:lstStyle/>
-                    <a:p>
-                      <a:endParaRPr lang="en-US" dirty="0"/>
-                    </a:p>
-                  </a:txBody>
-                  <a:tcPr/>
-                </a:tc>
-                <a:extLst>
-                  <a:ext uri="{0D108BD9-81ED-4DB2-BD59-A6C34878D82A}">
-                    <a16:rowId xmlns:a16="http://schemas.microsoft.com/office/drawing/2014/main" val="576643581"/>
-                  </a:ext>
-                </a:extLst>
-              </a:tr>
-              <a:tr h="413871">
-                <a:tc>
-                  <a:txBody>
-                    <a:bodyPr/>
-                    <a:lstStyle/>
-                    <a:p>
-                      <a:pPr lvl="0">
-                        <a:buNone/>
-                      </a:pPr>
-                      <a:r>
-                        <a:rPr lang="en-US" sz="1800" b="0" i="0" u="none" strike="noStrike" noProof="0">
+                        <a:rPr lang="en-US" sz="1800" b="0" i="0" u="none" strike="noStrike" noProof="0" dirty="0">
                           <a:solidFill>
                             <a:srgbClr val="000000"/>
                           </a:solidFill>
@@ -7613,17 +7574,20 @@
                         </a:rPr>
                         <a:t>Finn Perry</a:t>
                       </a:r>
-                      <a:endParaRPr lang="en-US"/>
-                    </a:p>
-                  </a:txBody>
-                  <a:tcPr/>
-                </a:tc>
-                <a:tc>
-                  <a:txBody>
-                    <a:bodyPr/>
-                    <a:lstStyle/>
-                    <a:p>
                       <a:endParaRPr lang="en-US" dirty="0"/>
+                    </a:p>
+                  </a:txBody>
+                  <a:tcPr/>
+                </a:tc>
+                <a:tc>
+                  <a:txBody>
+                    <a:bodyPr/>
+                    <a:lstStyle/>
+                    <a:p>
+                      <a:r>
+                        <a:rPr lang="en-US" dirty="0"/>
+                        <a:t>Bug fixes, updated textures, fixed hitboxes, updated menu and end scene, added new powerup model.</a:t>
+                      </a:r>
                     </a:p>
                   </a:txBody>
                   <a:tcPr/>
@@ -7660,7 +7624,7 @@
         </p:nvSpPr>
         <p:spPr>
           <a:xfrm>
-            <a:off x="1202918" y="5243394"/>
+            <a:off x="1202918" y="5765392"/>
             <a:ext cx="9784079" cy="808432"/>
           </a:xfrm>
         </p:spPr>
@@ -7670,13 +7634,7 @@
           <a:p>
             <a:r>
               <a:rPr lang="en-AU" b="1" dirty="0"/>
-              <a:t>Were all deliverables completed for the week?</a:t>
-            </a:r>
-          </a:p>
-          <a:p>
-            <a:r>
-              <a:rPr lang="en-AU" b="1" dirty="0"/>
-              <a:t>If not, how will the team compensate for this moving forward?</a:t>
+              <a:t>Were all deliverables completed for the week?		Yes</a:t>
             </a:r>
           </a:p>
         </p:txBody>
@@ -7754,14 +7712,14 @@
             <p:ph idx="1"/>
             <p:extLst>
               <p:ext uri="{D42A27DB-BD31-4B8C-83A1-F6EECF244321}">
-                <p14:modId xmlns:p14="http://schemas.microsoft.com/office/powerpoint/2010/main" val="4206229425"/>
+                <p14:modId xmlns:p14="http://schemas.microsoft.com/office/powerpoint/2010/main" val="840045965"/>
               </p:ext>
             </p:extLst>
           </p:nvPr>
         </p:nvGraphicFramePr>
         <p:xfrm>
           <a:off x="1206409" y="2276552"/>
-          <a:ext cx="9780588" cy="2709435"/>
+          <a:ext cx="9780588" cy="2295564"/>
         </p:xfrm>
         <a:graphic>
           <a:graphicData uri="http://schemas.openxmlformats.org/drawingml/2006/table">
@@ -8016,56 +7974,7 @@
                         <a:buNone/>
                       </a:pPr>
                       <a:r>
-                        <a:rPr lang="en-US" sz="1800" b="0" i="0" u="none" strike="noStrike" noProof="0">
-                          <a:solidFill>
-                            <a:srgbClr val="000000"/>
-                          </a:solidFill>
-                          <a:latin typeface="Corbel"/>
-                        </a:rPr>
-                        <a:t>Richard (Doug) Tilden</a:t>
-                      </a:r>
-                      <a:endParaRPr lang="en-US"/>
-                    </a:p>
-                  </a:txBody>
-                  <a:tcPr/>
-                </a:tc>
-                <a:tc>
-                  <a:txBody>
-                    <a:bodyPr/>
-                    <a:lstStyle/>
-                    <a:p>
-                      <a:endParaRPr lang="en-US" dirty="0"/>
-                    </a:p>
-                  </a:txBody>
-                  <a:tcPr/>
-                </a:tc>
-                <a:tc>
-                  <a:txBody>
-                    <a:bodyPr/>
-                    <a:lstStyle/>
-                    <a:p>
-                      <a:endParaRPr lang="en-US" dirty="0"/>
-                    </a:p>
-                  </a:txBody>
-                  <a:tcPr/>
-                </a:tc>
-                <a:extLst>
-                  <a:ext uri="{0D108BD9-81ED-4DB2-BD59-A6C34878D82A}">
-                    <a16:rowId xmlns:a16="http://schemas.microsoft.com/office/drawing/2014/main" val="576643581"/>
-                  </a:ext>
-                </a:extLst>
-              </a:tr>
-              <a:tr h="413871">
-                <a:tc>
-                  <a:txBody>
-                    <a:bodyPr/>
-                    <a:lstStyle/>
-                    <a:p>
-                      <a:pPr lvl="0">
-                        <a:buNone/>
-                      </a:pPr>
-                      <a:r>
-                        <a:rPr lang="en-US" sz="1800" b="0" i="0" u="none" strike="noStrike" noProof="0">
+                        <a:rPr lang="en-US" sz="1800" b="0" i="0" u="none" strike="noStrike" noProof="0" dirty="0">
                           <a:solidFill>
                             <a:srgbClr val="000000"/>
                           </a:solidFill>
@@ -8073,7 +7982,7 @@
                         </a:rPr>
                         <a:t>Finn Perry</a:t>
                       </a:r>
-                      <a:endParaRPr lang="en-US"/>
+                      <a:endParaRPr lang="en-US" dirty="0"/>
                     </a:p>
                   </a:txBody>
                   <a:tcPr/>
@@ -8214,14 +8123,14 @@
             <p:ph idx="1"/>
             <p:extLst>
               <p:ext uri="{D42A27DB-BD31-4B8C-83A1-F6EECF244321}">
-                <p14:modId xmlns:p14="http://schemas.microsoft.com/office/powerpoint/2010/main" val="539852157"/>
+                <p14:modId xmlns:p14="http://schemas.microsoft.com/office/powerpoint/2010/main" val="3802402620"/>
               </p:ext>
             </p:extLst>
           </p:nvPr>
         </p:nvGraphicFramePr>
         <p:xfrm>
           <a:off x="1206409" y="2276552"/>
-          <a:ext cx="9780588" cy="2709435"/>
+          <a:ext cx="9780588" cy="2295564"/>
         </p:xfrm>
         <a:graphic>
           <a:graphicData uri="http://schemas.openxmlformats.org/drawingml/2006/table">
@@ -8476,56 +8385,7 @@
                         <a:buNone/>
                       </a:pPr>
                       <a:r>
-                        <a:rPr lang="en-US" sz="1800" b="0" i="0" u="none" strike="noStrike" noProof="0">
-                          <a:solidFill>
-                            <a:srgbClr val="000000"/>
-                          </a:solidFill>
-                          <a:latin typeface="Corbel"/>
-                        </a:rPr>
-                        <a:t>Richard (Doug) Tilden</a:t>
-                      </a:r>
-                      <a:endParaRPr lang="en-US"/>
-                    </a:p>
-                  </a:txBody>
-                  <a:tcPr/>
-                </a:tc>
-                <a:tc>
-                  <a:txBody>
-                    <a:bodyPr/>
-                    <a:lstStyle/>
-                    <a:p>
-                      <a:endParaRPr lang="en-US" dirty="0"/>
-                    </a:p>
-                  </a:txBody>
-                  <a:tcPr/>
-                </a:tc>
-                <a:tc>
-                  <a:txBody>
-                    <a:bodyPr/>
-                    <a:lstStyle/>
-                    <a:p>
-                      <a:endParaRPr lang="en-US" dirty="0"/>
-                    </a:p>
-                  </a:txBody>
-                  <a:tcPr/>
-                </a:tc>
-                <a:extLst>
-                  <a:ext uri="{0D108BD9-81ED-4DB2-BD59-A6C34878D82A}">
-                    <a16:rowId xmlns:a16="http://schemas.microsoft.com/office/drawing/2014/main" val="576643581"/>
-                  </a:ext>
-                </a:extLst>
-              </a:tr>
-              <a:tr h="413871">
-                <a:tc>
-                  <a:txBody>
-                    <a:bodyPr/>
-                    <a:lstStyle/>
-                    <a:p>
-                      <a:pPr lvl="0">
-                        <a:buNone/>
-                      </a:pPr>
-                      <a:r>
-                        <a:rPr lang="en-US" sz="1800" b="0" i="0" u="none" strike="noStrike" noProof="0">
+                        <a:rPr lang="en-US" sz="1800" b="0" i="0" u="none" strike="noStrike" noProof="0" dirty="0">
                           <a:solidFill>
                             <a:srgbClr val="000000"/>
                           </a:solidFill>
@@ -8533,7 +8393,7 @@
                         </a:rPr>
                         <a:t>Finn Perry</a:t>
                       </a:r>
-                      <a:endParaRPr lang="en-US"/>
+                      <a:endParaRPr lang="en-US" dirty="0"/>
                     </a:p>
                   </a:txBody>
                   <a:tcPr/>

</xml_diff>